<commit_message>
2a Versão PITCH com imagem adicionada.
</commit_message>
<xml_diff>
--- a/PastaDocumetos/PITCH.pptx
+++ b/PastaDocumetos/PITCH.pptx
@@ -104,6 +104,11 @@
       </a:defRPr>
     </a:lvl9pPr>
   </p:defaultTextStyle>
+  <p:extLst>
+    <p:ext uri="{EFAFB233-063F-42B5-8137-9DF3F51BA10A}">
+      <p15:sldGuideLst xmlns:p15="http://schemas.microsoft.com/office/powerpoint/2012/main"/>
+    </p:ext>
+  </p:extLst>
 </p:presentation>
 </file>
 
@@ -3375,13 +3380,60 @@
           <a:lstStyle/>
           <a:p>
             <a:r>
-              <a:rPr lang="pt-BR"/>
+              <a:rPr lang="pt-BR" dirty="0"/>
               <a:t>Projeto Exemplo GIT</a:t>
             </a:r>
-            <a:endParaRPr lang="en-US"/>
-          </a:p>
-        </p:txBody>
-      </p:sp>
+            <a:endParaRPr lang="en-US" dirty="0"/>
+          </a:p>
+        </p:txBody>
+      </p:sp>
+      <p:pic>
+        <p:nvPicPr>
+          <p:cNvPr id="1026" name="Picture 2" descr="3 fatores essenciais para criar um projeto de acessibilidade completo -  Hand Talk">
+            <a:extLst>
+              <a:ext uri="{FF2B5EF4-FFF2-40B4-BE49-F238E27FC236}">
+                <a16:creationId xmlns:a16="http://schemas.microsoft.com/office/drawing/2014/main" id="{40C164FA-19E6-4C33-9684-E2CF42D5D99A}"/>
+              </a:ext>
+            </a:extLst>
+          </p:cNvPr>
+          <p:cNvPicPr>
+            <a:picLocks noChangeAspect="1" noChangeArrowheads="1"/>
+          </p:cNvPicPr>
+          <p:nvPr/>
+        </p:nvPicPr>
+        <p:blipFill>
+          <a:blip r:embed="rId2">
+            <a:extLst>
+              <a:ext uri="{28A0092B-C50C-407E-A947-70E740481C1C}">
+                <a14:useLocalDpi xmlns:a14="http://schemas.microsoft.com/office/drawing/2010/main" val="0"/>
+              </a:ext>
+            </a:extLst>
+          </a:blip>
+          <a:srcRect/>
+          <a:stretch>
+            <a:fillRect/>
+          </a:stretch>
+        </p:blipFill>
+        <p:spPr bwMode="auto">
+          <a:xfrm>
+            <a:off x="1809750" y="566738"/>
+            <a:ext cx="8572500" cy="5724525"/>
+          </a:xfrm>
+          <a:prstGeom prst="rect">
+            <a:avLst/>
+          </a:prstGeom>
+          <a:noFill/>
+          <a:extLst>
+            <a:ext uri="{909E8E84-426E-40DD-AFC4-6F175D3DCCD1}">
+              <a14:hiddenFill xmlns:a14="http://schemas.microsoft.com/office/drawing/2010/main">
+                <a:solidFill>
+                  <a:srgbClr val="FFFFFF"/>
+                </a:solidFill>
+              </a14:hiddenFill>
+            </a:ext>
+          </a:extLst>
+        </p:spPr>
+      </p:pic>
     </p:spTree>
     <p:extLst>
       <p:ext uri="{BB962C8B-B14F-4D97-AF65-F5344CB8AC3E}">

</xml_diff>